<commit_message>
Updated T-shirt slides in templates
</commit_message>
<xml_diff>
--- a/Api/Templates/Awards Ceremony - Full.pptx
+++ b/Api/Templates/Awards Ceremony - Full.pptx
@@ -19,7 +19,7 @@
     <p:sldId id="265" r:id="rId10"/>
     <p:sldId id="266" r:id="rId11"/>
     <p:sldId id="267" r:id="rId12"/>
-    <p:sldId id="299" r:id="rId13"/>
+    <p:sldId id="300" r:id="rId13"/>
     <p:sldId id="268" r:id="rId14"/>
     <p:sldId id="269" r:id="rId15"/>
     <p:sldId id="270" r:id="rId16"/>
@@ -308,6 +308,34 @@
     </p:ext>
   </p:extLst>
 </p:presentation>
+</file>
+
+<file path=ppt/changesInfos/changesInfo1.xml><?xml version="1.0" encoding="utf-8"?>
+<pc:chgInfo xmlns:a="http://schemas.openxmlformats.org/drawingml/2006/main" xmlns:r="http://schemas.openxmlformats.org/officeDocument/2006/relationships" xmlns:ac="http://schemas.microsoft.com/office/drawing/2013/main/command" xmlns:pc="http://schemas.microsoft.com/office/powerpoint/2013/main/command">
+  <pc:docChgLst>
+    <pc:chgData name="Brady Merkel" userId="077b44faa59125c6" providerId="LiveId" clId="{88FFB2AE-8425-4146-BCD9-29D03DAD4556}"/>
+    <pc:docChg chg="addSld delSld modSld">
+      <pc:chgData name="Brady Merkel" userId="077b44faa59125c6" providerId="LiveId" clId="{88FFB2AE-8425-4146-BCD9-29D03DAD4556}" dt="2024-11-22T16:31:02.270" v="1" actId="47"/>
+      <pc:docMkLst>
+        <pc:docMk/>
+      </pc:docMkLst>
+      <pc:sldChg chg="del">
+        <pc:chgData name="Brady Merkel" userId="077b44faa59125c6" providerId="LiveId" clId="{88FFB2AE-8425-4146-BCD9-29D03DAD4556}" dt="2024-11-22T16:31:02.270" v="1" actId="47"/>
+        <pc:sldMkLst>
+          <pc:docMk/>
+          <pc:sldMk cId="3897328644" sldId="299"/>
+        </pc:sldMkLst>
+      </pc:sldChg>
+      <pc:sldChg chg="add">
+        <pc:chgData name="Brady Merkel" userId="077b44faa59125c6" providerId="LiveId" clId="{88FFB2AE-8425-4146-BCD9-29D03DAD4556}" dt="2024-11-22T16:30:59.165" v="0"/>
+        <pc:sldMkLst>
+          <pc:docMk/>
+          <pc:sldMk cId="854740014" sldId="300"/>
+        </pc:sldMkLst>
+      </pc:sldChg>
+    </pc:docChg>
+  </pc:docChgLst>
+</pc:chgInfo>
 </file>
 
 <file path=ppt/notesMasters/notesMaster1.xml><?xml version="1.0" encoding="utf-8"?>
@@ -9634,6 +9662,35 @@
           </a:p>
         </p:txBody>
       </p:sp>
+      <p:pic>
+        <p:nvPicPr>
+          <p:cNvPr id="5" name="Picture 4">
+            <a:extLst>
+              <a:ext uri="{FF2B5EF4-FFF2-40B4-BE49-F238E27FC236}">
+                <a16:creationId xmlns:a16="http://schemas.microsoft.com/office/drawing/2014/main" id="{7CE04B72-2BA1-4604-359B-8D5898B010AC}"/>
+              </a:ext>
+            </a:extLst>
+          </p:cNvPr>
+          <p:cNvPicPr>
+            <a:picLocks noChangeAspect="1"/>
+          </p:cNvPicPr>
+          <p:nvPr/>
+        </p:nvPicPr>
+        <p:blipFill>
+          <a:blip r:embed="rId2"/>
+          <a:srcRect t="7739" b="16247"/>
+          <a:stretch/>
+        </p:blipFill>
+        <p:spPr>
+          <a:xfrm>
+            <a:off x="4721013" y="0"/>
+            <a:ext cx="4422987" cy="4350546"/>
+          </a:xfrm>
+          <a:prstGeom prst="rect">
+            <a:avLst/>
+          </a:prstGeom>
+        </p:spPr>
+      </p:pic>
       <p:sp>
         <p:nvSpPr>
           <p:cNvPr id="3" name="Text Placeholder 2">
@@ -9650,17 +9707,36 @@
             <p:ph type="body" idx="1"/>
           </p:nvPr>
         </p:nvSpPr>
-        <p:spPr/>
+        <p:spPr>
+          <a:xfrm>
+            <a:off x="193038" y="1007644"/>
+            <a:ext cx="5550749" cy="2419397"/>
+          </a:xfrm>
+        </p:spPr>
         <p:txBody>
           <a:bodyPr>
-            <a:normAutofit/>
+            <a:normAutofit fontScale="85000" lnSpcReduction="10000"/>
           </a:bodyPr>
           <a:lstStyle/>
           <a:p>
             <a:pPr marL="228600" indent="0"/>
             <a:r>
               <a:rPr lang="en-US" dirty="0"/>
-              <a:t>We asked all teams to enter a T-Shirt Design for the Regional Championship… This season’s winner is</a:t>
+              <a:t>We asked teams to enter a T-Shirt Design</a:t>
+            </a:r>
+            <a:br>
+              <a:rPr lang="en-US" dirty="0"/>
+            </a:br>
+            <a:r>
+              <a:rPr lang="en-US" dirty="0"/>
+              <a:t>for the Regional Championship…</a:t>
+            </a:r>
+            <a:br>
+              <a:rPr lang="en-US" dirty="0"/>
+            </a:br>
+            <a:r>
+              <a:rPr lang="en-US" dirty="0"/>
+              <a:t>This season’s winner is</a:t>
             </a:r>
           </a:p>
           <a:p>
@@ -9677,8 +9753,40 @@
                 <a:latin typeface="Roboto" panose="020B0604020202020204" charset="0"/>
                 <a:ea typeface="Roboto" panose="020B0604020202020204" charset="0"/>
               </a:rPr>
-              <a:t>The team wins an invitation to the Regional Championship, coming Friday/Saturday January 17, 18 at the </a:t>
+              <a:t>The team wins an invitation to the</a:t>
             </a:r>
+            <a:br>
+              <a:rPr lang="en-US" dirty="0">
+                <a:latin typeface="Roboto" panose="020B0604020202020204" charset="0"/>
+                <a:ea typeface="Roboto" panose="020B0604020202020204" charset="0"/>
+              </a:rPr>
+            </a:br>
+            <a:r>
+              <a:rPr lang="en-US" dirty="0">
+                <a:latin typeface="Roboto" panose="020B0604020202020204" charset="0"/>
+                <a:ea typeface="Roboto" panose="020B0604020202020204" charset="0"/>
+              </a:rPr>
+              <a:t>Regional Championship,</a:t>
+            </a:r>
+            <a:br>
+              <a:rPr lang="en-US" dirty="0">
+                <a:latin typeface="Roboto" panose="020B0604020202020204" charset="0"/>
+                <a:ea typeface="Roboto" panose="020B0604020202020204" charset="0"/>
+              </a:rPr>
+            </a:br>
+            <a:r>
+              <a:rPr lang="en-US" dirty="0">
+                <a:latin typeface="Roboto" panose="020B0604020202020204" charset="0"/>
+                <a:ea typeface="Roboto" panose="020B0604020202020204" charset="0"/>
+              </a:rPr>
+              <a:t>Friday/Saturday January 17, 18</a:t>
+            </a:r>
+            <a:br>
+              <a:rPr lang="en-US" dirty="0">
+                <a:latin typeface="Roboto" panose="020B0604020202020204" charset="0"/>
+                <a:ea typeface="Roboto" panose="020B0604020202020204" charset="0"/>
+              </a:rPr>
+            </a:br>
             <a:r>
               <a:rPr lang="en-US" b="0" i="0" dirty="0">
                 <a:solidFill>
@@ -9700,7 +9808,7 @@
     </p:spTree>
     <p:extLst>
       <p:ext uri="{BB962C8B-B14F-4D97-AF65-F5344CB8AC3E}">
-        <p14:creationId xmlns:p14="http://schemas.microsoft.com/office/powerpoint/2010/main" val="3897328644"/>
+        <p14:creationId xmlns:p14="http://schemas.microsoft.com/office/powerpoint/2010/main" val="854740014"/>
       </p:ext>
     </p:extLst>
   </p:cSld>

</xml_diff>

<commit_message>
Update PowerPoint files for Awards Ceremony
Updated binary content in "Awards Ceremony - Full.pptx" and "Awards Ceremony - Short.pptx". No specific text or code changes were detailed in the diff output.
</commit_message>
<xml_diff>
--- a/Api/Templates/Awards Ceremony - Full.pptx
+++ b/Api/Templates/Awards Ceremony - Full.pptx
@@ -565,14 +565,6 @@
           <pc:docMk/>
           <pc:sldMk cId="854740014" sldId="300"/>
         </pc:sldMkLst>
-        <pc:spChg chg="mod">
-          <ac:chgData name="Brady Merkel" userId="077b44faa59125c6" providerId="LiveId" clId="{88FFB2AE-8425-4146-BCD9-29D03DAD4556}" dt="2024-11-22T18:54:28.502" v="155" actId="113"/>
-          <ac:spMkLst>
-            <pc:docMk/>
-            <pc:sldMk cId="854740014" sldId="300"/>
-            <ac:spMk id="3" creationId="{C03E5D99-93D5-50C0-6E73-973C60A71B26}"/>
-          </ac:spMkLst>
-        </pc:spChg>
       </pc:sldChg>
       <pc:sldChg chg="modSp add mod">
         <pc:chgData name="Brady Merkel" userId="077b44faa59125c6" providerId="LiveId" clId="{88FFB2AE-8425-4146-BCD9-29D03DAD4556}" dt="2024-11-22T18:45:41.209" v="18" actId="6549"/>
@@ -580,14 +572,6 @@
           <pc:docMk/>
           <pc:sldMk cId="0" sldId="301"/>
         </pc:sldMkLst>
-        <pc:spChg chg="mod">
-          <ac:chgData name="Brady Merkel" userId="077b44faa59125c6" providerId="LiveId" clId="{88FFB2AE-8425-4146-BCD9-29D03DAD4556}" dt="2024-11-22T18:45:41.209" v="18" actId="6549"/>
-          <ac:spMkLst>
-            <pc:docMk/>
-            <pc:sldMk cId="0" sldId="301"/>
-            <ac:spMk id="79" creationId="{00000000-0000-0000-0000-000000000000}"/>
-          </ac:spMkLst>
-        </pc:spChg>
       </pc:sldChg>
       <pc:sldChg chg="delSp add mod">
         <pc:chgData name="Brady Merkel" userId="077b44faa59125c6" providerId="LiveId" clId="{88FFB2AE-8425-4146-BCD9-29D03DAD4556}" dt="2024-11-22T18:46:06.376" v="20" actId="21"/>
@@ -595,14 +579,6 @@
           <pc:docMk/>
           <pc:sldMk cId="0" sldId="302"/>
         </pc:sldMkLst>
-        <pc:picChg chg="del">
-          <ac:chgData name="Brady Merkel" userId="077b44faa59125c6" providerId="LiveId" clId="{88FFB2AE-8425-4146-BCD9-29D03DAD4556}" dt="2024-11-22T18:46:06.376" v="20" actId="21"/>
-          <ac:picMkLst>
-            <pc:docMk/>
-            <pc:sldMk cId="0" sldId="302"/>
-            <ac:picMk id="97" creationId="{00000000-0000-0000-0000-000000000000}"/>
-          </ac:picMkLst>
-        </pc:picChg>
       </pc:sldChg>
       <pc:sldChg chg="delSp modSp add mod">
         <pc:chgData name="Brady Merkel" userId="077b44faa59125c6" providerId="LiveId" clId="{88FFB2AE-8425-4146-BCD9-29D03DAD4556}" dt="2024-11-22T18:55:00.503" v="156" actId="478"/>
@@ -610,30 +586,6 @@
           <pc:docMk/>
           <pc:sldMk cId="0" sldId="303"/>
         </pc:sldMkLst>
-        <pc:spChg chg="mod">
-          <ac:chgData name="Brady Merkel" userId="077b44faa59125c6" providerId="LiveId" clId="{88FFB2AE-8425-4146-BCD9-29D03DAD4556}" dt="2024-11-22T18:49:19.679" v="34" actId="6549"/>
-          <ac:spMkLst>
-            <pc:docMk/>
-            <pc:sldMk cId="0" sldId="303"/>
-            <ac:spMk id="222" creationId="{00000000-0000-0000-0000-000000000000}"/>
-          </ac:spMkLst>
-        </pc:spChg>
-        <pc:spChg chg="mod">
-          <ac:chgData name="Brady Merkel" userId="077b44faa59125c6" providerId="LiveId" clId="{88FFB2AE-8425-4146-BCD9-29D03DAD4556}" dt="2024-11-22T18:49:53.803" v="39" actId="12"/>
-          <ac:spMkLst>
-            <pc:docMk/>
-            <pc:sldMk cId="0" sldId="303"/>
-            <ac:spMk id="226" creationId="{00000000-0000-0000-0000-000000000000}"/>
-          </ac:spMkLst>
-        </pc:spChg>
-        <pc:picChg chg="del">
-          <ac:chgData name="Brady Merkel" userId="077b44faa59125c6" providerId="LiveId" clId="{88FFB2AE-8425-4146-BCD9-29D03DAD4556}" dt="2024-11-22T18:55:00.503" v="156" actId="478"/>
-          <ac:picMkLst>
-            <pc:docMk/>
-            <pc:sldMk cId="0" sldId="303"/>
-            <ac:picMk id="223" creationId="{00000000-0000-0000-0000-000000000000}"/>
-          </ac:picMkLst>
-        </pc:picChg>
       </pc:sldChg>
       <pc:sldChg chg="delSp modSp add mod">
         <pc:chgData name="Brady Merkel" userId="077b44faa59125c6" providerId="LiveId" clId="{88FFB2AE-8425-4146-BCD9-29D03DAD4556}" dt="2024-11-22T18:52:02.334" v="118" actId="1035"/>
@@ -641,78 +593,6 @@
           <pc:docMk/>
           <pc:sldMk cId="0" sldId="304"/>
         </pc:sldMkLst>
-        <pc:spChg chg="mod">
-          <ac:chgData name="Brady Merkel" userId="077b44faa59125c6" providerId="LiveId" clId="{88FFB2AE-8425-4146-BCD9-29D03DAD4556}" dt="2024-11-22T18:50:53.024" v="47" actId="20577"/>
-          <ac:spMkLst>
-            <pc:docMk/>
-            <pc:sldMk cId="0" sldId="304"/>
-            <ac:spMk id="236" creationId="{00000000-0000-0000-0000-000000000000}"/>
-          </ac:spMkLst>
-        </pc:spChg>
-        <pc:spChg chg="mod">
-          <ac:chgData name="Brady Merkel" userId="077b44faa59125c6" providerId="LiveId" clId="{88FFB2AE-8425-4146-BCD9-29D03DAD4556}" dt="2024-11-22T18:50:46.312" v="44" actId="20577"/>
-          <ac:spMkLst>
-            <pc:docMk/>
-            <pc:sldMk cId="0" sldId="304"/>
-            <ac:spMk id="237" creationId="{00000000-0000-0000-0000-000000000000}"/>
-          </ac:spMkLst>
-        </pc:spChg>
-        <pc:spChg chg="mod">
-          <ac:chgData name="Brady Merkel" userId="077b44faa59125c6" providerId="LiveId" clId="{88FFB2AE-8425-4146-BCD9-29D03DAD4556}" dt="2024-11-22T18:50:39.216" v="41"/>
-          <ac:spMkLst>
-            <pc:docMk/>
-            <pc:sldMk cId="0" sldId="304"/>
-            <ac:spMk id="238" creationId="{00000000-0000-0000-0000-000000000000}"/>
-          </ac:spMkLst>
-        </pc:spChg>
-        <pc:spChg chg="mod">
-          <ac:chgData name="Brady Merkel" userId="077b44faa59125c6" providerId="LiveId" clId="{88FFB2AE-8425-4146-BCD9-29D03DAD4556}" dt="2024-11-22T18:50:59.032" v="50" actId="20577"/>
-          <ac:spMkLst>
-            <pc:docMk/>
-            <pc:sldMk cId="0" sldId="304"/>
-            <ac:spMk id="239" creationId="{00000000-0000-0000-0000-000000000000}"/>
-          </ac:spMkLst>
-        </pc:spChg>
-        <pc:spChg chg="mod">
-          <ac:chgData name="Brady Merkel" userId="077b44faa59125c6" providerId="LiveId" clId="{88FFB2AE-8425-4146-BCD9-29D03DAD4556}" dt="2024-11-22T18:51:07.368" v="54" actId="20577"/>
-          <ac:spMkLst>
-            <pc:docMk/>
-            <pc:sldMk cId="0" sldId="304"/>
-            <ac:spMk id="240" creationId="{00000000-0000-0000-0000-000000000000}"/>
-          </ac:spMkLst>
-        </pc:spChg>
-        <pc:spChg chg="mod">
-          <ac:chgData name="Brady Merkel" userId="077b44faa59125c6" providerId="LiveId" clId="{88FFB2AE-8425-4146-BCD9-29D03DAD4556}" dt="2024-11-22T18:51:46.643" v="77" actId="6549"/>
-          <ac:spMkLst>
-            <pc:docMk/>
-            <pc:sldMk cId="0" sldId="304"/>
-            <ac:spMk id="242" creationId="{00000000-0000-0000-0000-000000000000}"/>
-          </ac:spMkLst>
-        </pc:spChg>
-        <pc:spChg chg="mod">
-          <ac:chgData name="Brady Merkel" userId="077b44faa59125c6" providerId="LiveId" clId="{88FFB2AE-8425-4146-BCD9-29D03DAD4556}" dt="2024-11-22T18:51:37.929" v="73" actId="6549"/>
-          <ac:spMkLst>
-            <pc:docMk/>
-            <pc:sldMk cId="0" sldId="304"/>
-            <ac:spMk id="243" creationId="{00000000-0000-0000-0000-000000000000}"/>
-          </ac:spMkLst>
-        </pc:spChg>
-        <pc:picChg chg="del">
-          <ac:chgData name="Brady Merkel" userId="077b44faa59125c6" providerId="LiveId" clId="{88FFB2AE-8425-4146-BCD9-29D03DAD4556}" dt="2024-11-22T18:51:12.593" v="55" actId="478"/>
-          <ac:picMkLst>
-            <pc:docMk/>
-            <pc:sldMk cId="0" sldId="304"/>
-            <ac:picMk id="234" creationId="{00000000-0000-0000-0000-000000000000}"/>
-          </ac:picMkLst>
-        </pc:picChg>
-        <pc:picChg chg="mod">
-          <ac:chgData name="Brady Merkel" userId="077b44faa59125c6" providerId="LiveId" clId="{88FFB2AE-8425-4146-BCD9-29D03DAD4556}" dt="2024-11-22T18:52:02.334" v="118" actId="1035"/>
-          <ac:picMkLst>
-            <pc:docMk/>
-            <pc:sldMk cId="0" sldId="304"/>
-            <ac:picMk id="235" creationId="{00000000-0000-0000-0000-000000000000}"/>
-          </ac:picMkLst>
-        </pc:picChg>
       </pc:sldChg>
       <pc:sldChg chg="delSp modSp add mod">
         <pc:chgData name="Brady Merkel" userId="077b44faa59125c6" providerId="LiveId" clId="{88FFB2AE-8425-4146-BCD9-29D03DAD4556}" dt="2024-11-22T18:55:29.496" v="170" actId="404"/>
@@ -720,22 +600,6 @@
           <pc:docMk/>
           <pc:sldMk cId="0" sldId="305"/>
         </pc:sldMkLst>
-        <pc:spChg chg="mod">
-          <ac:chgData name="Brady Merkel" userId="077b44faa59125c6" providerId="LiveId" clId="{88FFB2AE-8425-4146-BCD9-29D03DAD4556}" dt="2024-11-22T18:55:29.496" v="170" actId="404"/>
-          <ac:spMkLst>
-            <pc:docMk/>
-            <pc:sldMk cId="0" sldId="305"/>
-            <ac:spMk id="249" creationId="{00000000-0000-0000-0000-000000000000}"/>
-          </ac:spMkLst>
-        </pc:spChg>
-        <pc:picChg chg="del">
-          <ac:chgData name="Brady Merkel" userId="077b44faa59125c6" providerId="LiveId" clId="{88FFB2AE-8425-4146-BCD9-29D03DAD4556}" dt="2024-11-22T18:52:24.994" v="121" actId="478"/>
-          <ac:picMkLst>
-            <pc:docMk/>
-            <pc:sldMk cId="0" sldId="305"/>
-            <ac:picMk id="250" creationId="{00000000-0000-0000-0000-000000000000}"/>
-          </ac:picMkLst>
-        </pc:picChg>
       </pc:sldChg>
       <pc:sldChg chg="modSp add mod">
         <pc:chgData name="Brady Merkel" userId="077b44faa59125c6" providerId="LiveId" clId="{88FFB2AE-8425-4146-BCD9-29D03DAD4556}" dt="2024-11-22T18:52:56.156" v="130" actId="6549"/>
@@ -743,14 +607,6 @@
           <pc:docMk/>
           <pc:sldMk cId="0" sldId="306"/>
         </pc:sldMkLst>
-        <pc:spChg chg="mod">
-          <ac:chgData name="Brady Merkel" userId="077b44faa59125c6" providerId="LiveId" clId="{88FFB2AE-8425-4146-BCD9-29D03DAD4556}" dt="2024-11-22T18:52:56.156" v="130" actId="6549"/>
-          <ac:spMkLst>
-            <pc:docMk/>
-            <pc:sldMk cId="0" sldId="306"/>
-            <ac:spMk id="259" creationId="{00000000-0000-0000-0000-000000000000}"/>
-          </ac:spMkLst>
-        </pc:spChg>
       </pc:sldChg>
       <pc:sldMasterChg chg="modSldLayout">
         <pc:chgData name="Brady Merkel" userId="077b44faa59125c6" providerId="LiveId" clId="{88FFB2AE-8425-4146-BCD9-29D03DAD4556}" dt="2024-11-22T18:46:32.106" v="23" actId="732"/>
@@ -765,15 +621,6 @@
             <pc:sldMasterMk cId="0" sldId="2147483665"/>
             <pc:sldLayoutMk cId="0" sldId="2147483662"/>
           </pc:sldLayoutMkLst>
-          <pc:picChg chg="add mod modCrop">
-            <ac:chgData name="Brady Merkel" userId="077b44faa59125c6" providerId="LiveId" clId="{88FFB2AE-8425-4146-BCD9-29D03DAD4556}" dt="2024-11-22T18:46:32.106" v="23" actId="732"/>
-            <ac:picMkLst>
-              <pc:docMk/>
-              <pc:sldMasterMk cId="0" sldId="2147483665"/>
-              <pc:sldLayoutMk cId="0" sldId="2147483662"/>
-              <ac:picMk id="97" creationId="{00000000-0000-0000-0000-000000000000}"/>
-            </ac:picMkLst>
-          </pc:picChg>
         </pc:sldLayoutChg>
       </pc:sldMasterChg>
     </pc:docChg>
@@ -6073,8 +5920,13 @@
     <p:bg>
       <p:bgPr>
         <a:blipFill>
-          <a:blip r:embed="rId2">
+          <a:blip r:embed="rId2" cstate="print">
             <a:alphaModFix/>
+            <a:extLst>
+              <a:ext uri="{28A0092B-C50C-407E-A947-70E740481C1C}">
+                <a14:useLocalDpi xmlns:a14="http://schemas.microsoft.com/office/drawing/2010/main"/>
+              </a:ext>
+            </a:extLst>
           </a:blip>
           <a:stretch>
             <a:fillRect/>
@@ -6694,8 +6546,13 @@
     <p:bg>
       <p:bgPr>
         <a:blipFill>
-          <a:blip r:embed="rId2">
+          <a:blip r:embed="rId2" cstate="print">
             <a:alphaModFix/>
+            <a:extLst>
+              <a:ext uri="{28A0092B-C50C-407E-A947-70E740481C1C}">
+                <a14:useLocalDpi xmlns:a14="http://schemas.microsoft.com/office/drawing/2010/main"/>
+              </a:ext>
+            </a:extLst>
           </a:blip>
           <a:stretch>
             <a:fillRect/>
@@ -7345,8 +7202,13 @@
     <p:bg>
       <p:bgPr>
         <a:blipFill>
-          <a:blip r:embed="rId2">
+          <a:blip r:embed="rId2" cstate="print">
             <a:alphaModFix/>
+            <a:extLst>
+              <a:ext uri="{28A0092B-C50C-407E-A947-70E740481C1C}">
+                <a14:useLocalDpi xmlns:a14="http://schemas.microsoft.com/office/drawing/2010/main"/>
+              </a:ext>
+            </a:extLst>
           </a:blip>
           <a:stretch>
             <a:fillRect/>
@@ -7959,10 +7821,15 @@
           <p:nvPr userDrawn="1"/>
         </p:nvPicPr>
         <p:blipFill>
-          <a:blip r:embed="rId3">
+          <a:blip r:embed="rId3" cstate="print">
             <a:alphaModFix/>
+            <a:extLst>
+              <a:ext uri="{28A0092B-C50C-407E-A947-70E740481C1C}">
+                <a14:useLocalDpi xmlns:a14="http://schemas.microsoft.com/office/drawing/2010/main"/>
+              </a:ext>
+            </a:extLst>
           </a:blip>
-          <a:srcRect t="20173" b="27037"/>
+          <a:srcRect/>
           <a:stretch/>
         </p:blipFill>
         <p:spPr>
@@ -7993,8 +7860,13 @@
     <p:bg>
       <p:bgPr>
         <a:blipFill>
-          <a:blip r:embed="rId2">
+          <a:blip r:embed="rId2" cstate="print">
             <a:alphaModFix/>
+            <a:extLst>
+              <a:ext uri="{28A0092B-C50C-407E-A947-70E740481C1C}">
+                <a14:useLocalDpi xmlns:a14="http://schemas.microsoft.com/office/drawing/2010/main"/>
+              </a:ext>
+            </a:extLst>
           </a:blip>
           <a:stretch>
             <a:fillRect/>
@@ -8427,8 +8299,13 @@
     <p:bg>
       <p:bgPr>
         <a:blipFill>
-          <a:blip r:embed="rId7">
+          <a:blip r:embed="rId7" cstate="print">
             <a:alphaModFix/>
+            <a:extLst>
+              <a:ext uri="{28A0092B-C50C-407E-A947-70E740481C1C}">
+                <a14:useLocalDpi xmlns:a14="http://schemas.microsoft.com/office/drawing/2010/main"/>
+              </a:ext>
+            </a:extLst>
           </a:blip>
           <a:stretch>
             <a:fillRect/>
@@ -9977,8 +9854,13 @@
     <p:bg>
       <p:bgPr>
         <a:blipFill>
-          <a:blip r:embed="rId3">
+          <a:blip r:embed="rId3" cstate="print">
             <a:alphaModFix/>
+            <a:extLst>
+              <a:ext uri="{28A0092B-C50C-407E-A947-70E740481C1C}">
+                <a14:useLocalDpi xmlns:a14="http://schemas.microsoft.com/office/drawing/2010/main"/>
+              </a:ext>
+            </a:extLst>
           </a:blip>
           <a:stretch>
             <a:fillRect/>
@@ -10434,7 +10316,13 @@
           <p:nvPr/>
         </p:nvPicPr>
         <p:blipFill>
-          <a:blip r:embed="rId2"/>
+          <a:blip r:embed="rId2" cstate="print">
+            <a:extLst>
+              <a:ext uri="{28A0092B-C50C-407E-A947-70E740481C1C}">
+                <a14:useLocalDpi xmlns:a14="http://schemas.microsoft.com/office/drawing/2010/main"/>
+              </a:ext>
+            </a:extLst>
+          </a:blip>
           <a:srcRect t="7739" b="16247"/>
           <a:stretch/>
         </p:blipFill>
@@ -11431,8 +11319,13 @@
           <p:nvPr/>
         </p:nvPicPr>
         <p:blipFill>
-          <a:blip r:embed="rId3">
+          <a:blip r:embed="rId3" cstate="print">
             <a:alphaModFix/>
+            <a:extLst>
+              <a:ext uri="{28A0092B-C50C-407E-A947-70E740481C1C}">
+                <a14:useLocalDpi xmlns:a14="http://schemas.microsoft.com/office/drawing/2010/main"/>
+              </a:ext>
+            </a:extLst>
           </a:blip>
           <a:stretch>
             <a:fillRect/>
@@ -14280,8 +14173,13 @@
           <p:nvPr/>
         </p:nvPicPr>
         <p:blipFill>
-          <a:blip r:embed="rId3">
+          <a:blip r:embed="rId3" cstate="print">
             <a:alphaModFix/>
+            <a:extLst>
+              <a:ext uri="{28A0092B-C50C-407E-A947-70E740481C1C}">
+                <a14:useLocalDpi xmlns:a14="http://schemas.microsoft.com/office/drawing/2010/main"/>
+              </a:ext>
+            </a:extLst>
           </a:blip>
           <a:stretch>
             <a:fillRect/>

</xml_diff>

<commit_message>
Update PowerPoint presentations for awards ceremony
Modified binary files for "Awards Ceremony - Full.pptx" and "Awards Ceremony - Short.pptx". Changes include updates to slides, text, images, and other elements within the presentations.
</commit_message>
<xml_diff>
--- a/Api/Templates/Awards Ceremony - Full.pptx
+++ b/Api/Templates/Awards Ceremony - Full.pptx
@@ -611,7 +611,7 @@
   <pc:docChgLst>
     <pc:chgData name="Brady Merkel" userId="077b44faa59125c6" providerId="LiveId" clId="{E242539A-166A-43D6-9CE7-B9B986C889D9}"/>
     <pc:docChg chg="undo custSel delSld modSld modMainMaster">
-      <pc:chgData name="Brady Merkel" userId="077b44faa59125c6" providerId="LiveId" clId="{E242539A-166A-43D6-9CE7-B9B986C889D9}" dt="2025-06-01T14:22:05.219" v="169" actId="6549"/>
+      <pc:chgData name="Brady Merkel" userId="077b44faa59125c6" providerId="LiveId" clId="{E242539A-166A-43D6-9CE7-B9B986C889D9}" dt="2025-06-01T14:36:04.103" v="184" actId="403"/>
       <pc:docMkLst>
         <pc:docMk/>
       </pc:docMkLst>
@@ -784,8 +784,39 @@
           </ac:picMkLst>
         </pc:picChg>
       </pc:sldChg>
+      <pc:sldChg chg="delSp modSp mod modClrScheme chgLayout">
+        <pc:chgData name="Brady Merkel" userId="077b44faa59125c6" providerId="LiveId" clId="{E242539A-166A-43D6-9CE7-B9B986C889D9}" dt="2025-06-01T14:36:04.103" v="184" actId="403"/>
+        <pc:sldMkLst>
+          <pc:docMk/>
+          <pc:sldMk cId="0" sldId="306"/>
+        </pc:sldMkLst>
+        <pc:spChg chg="mod ord">
+          <ac:chgData name="Brady Merkel" userId="077b44faa59125c6" providerId="LiveId" clId="{E242539A-166A-43D6-9CE7-B9B986C889D9}" dt="2025-06-01T14:35:56.922" v="176" actId="700"/>
+          <ac:spMkLst>
+            <pc:docMk/>
+            <pc:sldMk cId="0" sldId="306"/>
+            <ac:spMk id="255" creationId="{00000000-0000-0000-0000-000000000000}"/>
+          </ac:spMkLst>
+        </pc:spChg>
+        <pc:spChg chg="mod ord">
+          <ac:chgData name="Brady Merkel" userId="077b44faa59125c6" providerId="LiveId" clId="{E242539A-166A-43D6-9CE7-B9B986C889D9}" dt="2025-06-01T14:36:04.103" v="184" actId="403"/>
+          <ac:spMkLst>
+            <pc:docMk/>
+            <pc:sldMk cId="0" sldId="306"/>
+            <ac:spMk id="256" creationId="{00000000-0000-0000-0000-000000000000}"/>
+          </ac:spMkLst>
+        </pc:spChg>
+        <pc:picChg chg="del">
+          <ac:chgData name="Brady Merkel" userId="077b44faa59125c6" providerId="LiveId" clId="{E242539A-166A-43D6-9CE7-B9B986C889D9}" dt="2025-06-01T14:35:47.114" v="175" actId="478"/>
+          <ac:picMkLst>
+            <pc:docMk/>
+            <pc:sldMk cId="0" sldId="306"/>
+            <ac:picMk id="257" creationId="{00000000-0000-0000-0000-000000000000}"/>
+          </ac:picMkLst>
+        </pc:picChg>
+      </pc:sldChg>
       <pc:sldMasterChg chg="modSp mod setBg delSldLayout modSldLayout">
-        <pc:chgData name="Brady Merkel" userId="077b44faa59125c6" providerId="LiveId" clId="{E242539A-166A-43D6-9CE7-B9B986C889D9}" dt="2025-06-01T14:18:39.099" v="76" actId="179"/>
+        <pc:chgData name="Brady Merkel" userId="077b44faa59125c6" providerId="LiveId" clId="{E242539A-166A-43D6-9CE7-B9B986C889D9}" dt="2025-06-01T14:34:30.287" v="174" actId="1076"/>
         <pc:sldMasterMkLst>
           <pc:docMk/>
           <pc:sldMasterMk cId="0" sldId="2147483665"/>
@@ -908,8 +939,8 @@
             </ac:spMkLst>
           </pc:spChg>
         </pc:sldLayoutChg>
-        <pc:sldLayoutChg chg="modSp setBg">
-          <pc:chgData name="Brady Merkel" userId="077b44faa59125c6" providerId="LiveId" clId="{E242539A-166A-43D6-9CE7-B9B986C889D9}" dt="2025-06-01T14:12:19.405" v="43" actId="2711"/>
+        <pc:sldLayoutChg chg="addSp delSp modSp mod setBg">
+          <pc:chgData name="Brady Merkel" userId="077b44faa59125c6" providerId="LiveId" clId="{E242539A-166A-43D6-9CE7-B9B986C889D9}" dt="2025-06-01T14:34:30.287" v="174" actId="1076"/>
           <pc:sldLayoutMkLst>
             <pc:docMk/>
             <pc:sldMasterMk cId="0" sldId="2147483665"/>
@@ -942,6 +973,24 @@
               <ac:spMk id="67" creationId="{00000000-0000-0000-0000-000000000000}"/>
             </ac:spMkLst>
           </pc:spChg>
+          <pc:picChg chg="add del mod">
+            <ac:chgData name="Brady Merkel" userId="077b44faa59125c6" providerId="LiveId" clId="{E242539A-166A-43D6-9CE7-B9B986C889D9}" dt="2025-06-01T14:34:30.287" v="174" actId="1076"/>
+            <ac:picMkLst>
+              <pc:docMk/>
+              <pc:sldMasterMk cId="0" sldId="2147483665"/>
+              <pc:sldLayoutMk cId="0" sldId="2147483662"/>
+              <ac:picMk id="2" creationId="{EFC8FCB6-7086-E6D6-03CF-7DDAD3F33552}"/>
+            </ac:picMkLst>
+          </pc:picChg>
+          <pc:picChg chg="del">
+            <ac:chgData name="Brady Merkel" userId="077b44faa59125c6" providerId="LiveId" clId="{E242539A-166A-43D6-9CE7-B9B986C889D9}" dt="2025-06-01T14:34:25.567" v="173" actId="478"/>
+            <ac:picMkLst>
+              <pc:docMk/>
+              <pc:sldMasterMk cId="0" sldId="2147483665"/>
+              <pc:sldLayoutMk cId="0" sldId="2147483662"/>
+              <ac:picMk id="97" creationId="{00000000-0000-0000-0000-000000000000}"/>
+            </ac:picMkLst>
+          </pc:picChg>
         </pc:sldLayoutChg>
         <pc:sldLayoutChg chg="setBg">
           <pc:chgData name="Brady Merkel" userId="077b44faa59125c6" providerId="LiveId" clId="{E242539A-166A-43D6-9CE7-B9B986C889D9}" dt="2025-03-23T23:33:36.938" v="10"/>
@@ -6169,7 +6218,7 @@
             </a:lvl9pPr>
           </a:lstStyle>
           <a:p>
-            <a:endParaRPr/>
+            <a:endParaRPr dirty="0"/>
           </a:p>
         </p:txBody>
       </p:sp>
@@ -7651,34 +7700,38 @@
       </p:sp>
       <p:pic>
         <p:nvPicPr>
-          <p:cNvPr id="97" name="Google Shape;97;p23"/>
-          <p:cNvPicPr preferRelativeResize="0"/>
+          <p:cNvPr id="2" name="Graphic 1">
+            <a:extLst>
+              <a:ext uri="{FF2B5EF4-FFF2-40B4-BE49-F238E27FC236}">
+                <a16:creationId xmlns:a16="http://schemas.microsoft.com/office/drawing/2014/main" id="{EFC8FCB6-7086-E6D6-03CF-7DDAD3F33552}"/>
+              </a:ext>
+            </a:extLst>
+          </p:cNvPr>
+          <p:cNvPicPr>
+            <a:picLocks noChangeAspect="1"/>
+          </p:cNvPicPr>
           <p:nvPr userDrawn="1"/>
         </p:nvPicPr>
         <p:blipFill>
-          <a:blip r:embed="rId2" cstate="print">
-            <a:alphaModFix/>
+          <a:blip r:embed="rId2">
             <a:extLst>
-              <a:ext uri="{28A0092B-C50C-407E-A947-70E740481C1C}">
-                <a14:useLocalDpi xmlns:a14="http://schemas.microsoft.com/office/drawing/2010/main"/>
+              <a:ext uri="{96DAC541-7B7A-43D3-8B79-37D633B846F1}">
+                <asvg:svgBlip xmlns:asvg="http://schemas.microsoft.com/office/drawing/2016/SVG/main" r:embed="rId3"/>
               </a:ext>
             </a:extLst>
           </a:blip>
-          <a:srcRect/>
-          <a:stretch/>
+          <a:stretch>
+            <a:fillRect/>
+          </a:stretch>
         </p:blipFill>
         <p:spPr>
           <a:xfrm>
-            <a:off x="3910425" y="4362450"/>
-            <a:ext cx="1323150" cy="698500"/>
+            <a:off x="3878142" y="4404419"/>
+            <a:ext cx="1387716" cy="629480"/>
           </a:xfrm>
           <a:prstGeom prst="rect">
             <a:avLst/>
           </a:prstGeom>
-          <a:noFill/>
-          <a:ln>
-            <a:noFill/>
-          </a:ln>
         </p:spPr>
       </p:pic>
     </p:spTree>
@@ -14144,10 +14197,6 @@
           </p:nvPr>
         </p:nvSpPr>
         <p:spPr>
-          <a:xfrm>
-            <a:off x="301710" y="773024"/>
-            <a:ext cx="8460900" cy="654300"/>
-          </a:xfrm>
           <a:prstGeom prst="rect">
             <a:avLst/>
           </a:prstGeom>
@@ -14206,10 +14255,6 @@
           </p:nvPr>
         </p:nvSpPr>
         <p:spPr>
-          <a:xfrm>
-            <a:off x="301711" y="1427350"/>
-            <a:ext cx="8460900" cy="360300"/>
-          </a:xfrm>
           <a:prstGeom prst="rect">
             <a:avLst/>
           </a:prstGeom>
@@ -14242,41 +14287,13 @@
               <a:buNone/>
             </a:pPr>
             <a:r>
-              <a:rPr lang="en"/>
+              <a:rPr lang="en" sz="4000" dirty="0"/>
               <a:t>We hope to see you at the</a:t>
             </a:r>
-            <a:endParaRPr/>
+            <a:endParaRPr sz="4000" dirty="0"/>
           </a:p>
         </p:txBody>
       </p:sp>
-      <p:pic>
-        <p:nvPicPr>
-          <p:cNvPr id="257" name="Google Shape;257;p45"/>
-          <p:cNvPicPr preferRelativeResize="0"/>
-          <p:nvPr/>
-        </p:nvPicPr>
-        <p:blipFill>
-          <a:blip r:embed="rId3">
-            <a:alphaModFix/>
-          </a:blip>
-          <a:stretch>
-            <a:fillRect/>
-          </a:stretch>
-        </p:blipFill>
-        <p:spPr>
-          <a:xfrm>
-            <a:off x="3319350" y="3089475"/>
-            <a:ext cx="2255900" cy="2255900"/>
-          </a:xfrm>
-          <a:prstGeom prst="rect">
-            <a:avLst/>
-          </a:prstGeom>
-          <a:noFill/>
-          <a:ln>
-            <a:noFill/>
-          </a:ln>
-        </p:spPr>
-      </p:pic>
       <p:sp>
         <p:nvSpPr>
           <p:cNvPr id="258" name="Google Shape;258;p45"/>

</xml_diff>